<commit_message>
Report and PowerPoint Started
</commit_message>
<xml_diff>
--- a/doc/TrafficFlow1Presentation.pptx
+++ b/doc/TrafficFlow1Presentation.pptx
@@ -6,7 +6,23 @@
   </p:sldMasterIdLst>
   <p:sldIdLst>
     <p:sldId id="256" r:id="rId2"/>
-    <p:sldId id="257" r:id="rId3"/>
+    <p:sldId id="259" r:id="rId3"/>
+    <p:sldId id="258" r:id="rId4"/>
+    <p:sldId id="261" r:id="rId5"/>
+    <p:sldId id="273" r:id="rId6"/>
+    <p:sldId id="260" r:id="rId7"/>
+    <p:sldId id="272" r:id="rId8"/>
+    <p:sldId id="262" r:id="rId9"/>
+    <p:sldId id="264" r:id="rId10"/>
+    <p:sldId id="263" r:id="rId11"/>
+    <p:sldId id="265" r:id="rId12"/>
+    <p:sldId id="266" r:id="rId13"/>
+    <p:sldId id="267" r:id="rId14"/>
+    <p:sldId id="268" r:id="rId15"/>
+    <p:sldId id="269" r:id="rId16"/>
+    <p:sldId id="270" r:id="rId17"/>
+    <p:sldId id="271" r:id="rId18"/>
+    <p:sldId id="257" r:id="rId19"/>
   </p:sldIdLst>
   <p:sldSz cx="12192000" cy="6858000"/>
   <p:notesSz cx="6858000" cy="9144000"/>
@@ -105,6 +121,11 @@
       </a:defRPr>
     </a:lvl9pPr>
   </p:defaultTextStyle>
+  <p:extLst>
+    <p:ext uri="{EFAFB233-063F-42B5-8137-9DF3F51BA10A}">
+      <p15:sldGuideLst xmlns:p15="http://schemas.microsoft.com/office/powerpoint/2012/main"/>
+    </p:ext>
+  </p:extLst>
 </p:presentation>
 </file>
 
@@ -303,7 +324,7 @@
           <a:p>
             <a:fld id="{A980CFCE-CCF4-4BEA-8DA1-0DCFE03AA282}" type="datetimeFigureOut">
               <a:rPr lang="en-US" smtClean="0"/>
-              <a:t>8/3/2017</a:t>
+              <a:t>8/10/2017</a:t>
             </a:fld>
             <a:endParaRPr lang="en-US"/>
           </a:p>
@@ -739,7 +760,7 @@
           <a:p>
             <a:fld id="{A980CFCE-CCF4-4BEA-8DA1-0DCFE03AA282}" type="datetimeFigureOut">
               <a:rPr lang="en-US" smtClean="0"/>
-              <a:t>8/3/2017</a:t>
+              <a:t>8/10/2017</a:t>
             </a:fld>
             <a:endParaRPr lang="en-US"/>
           </a:p>
@@ -989,7 +1010,7 @@
           <a:p>
             <a:fld id="{A980CFCE-CCF4-4BEA-8DA1-0DCFE03AA282}" type="datetimeFigureOut">
               <a:rPr lang="en-US" smtClean="0"/>
-              <a:t>8/3/2017</a:t>
+              <a:t>8/10/2017</a:t>
             </a:fld>
             <a:endParaRPr lang="en-US"/>
           </a:p>
@@ -1297,7 +1318,7 @@
           <a:p>
             <a:fld id="{A980CFCE-CCF4-4BEA-8DA1-0DCFE03AA282}" type="datetimeFigureOut">
               <a:rPr lang="en-US" smtClean="0"/>
-              <a:t>8/3/2017</a:t>
+              <a:t>8/10/2017</a:t>
             </a:fld>
             <a:endParaRPr lang="en-US"/>
           </a:p>
@@ -1615,7 +1636,7 @@
           <a:p>
             <a:fld id="{A980CFCE-CCF4-4BEA-8DA1-0DCFE03AA282}" type="datetimeFigureOut">
               <a:rPr lang="en-US" smtClean="0"/>
-              <a:t>8/3/2017</a:t>
+              <a:t>8/10/2017</a:t>
             </a:fld>
             <a:endParaRPr lang="en-US"/>
           </a:p>
@@ -1917,7 +1938,7 @@
           <a:p>
             <a:fld id="{A980CFCE-CCF4-4BEA-8DA1-0DCFE03AA282}" type="datetimeFigureOut">
               <a:rPr lang="en-US" smtClean="0"/>
-              <a:t>8/3/2017</a:t>
+              <a:t>8/10/2017</a:t>
             </a:fld>
             <a:endParaRPr lang="en-US"/>
           </a:p>
@@ -2284,7 +2305,7 @@
           <a:p>
             <a:fld id="{A980CFCE-CCF4-4BEA-8DA1-0DCFE03AA282}" type="datetimeFigureOut">
               <a:rPr lang="en-US" smtClean="0"/>
-              <a:t>8/3/2017</a:t>
+              <a:t>8/10/2017</a:t>
             </a:fld>
             <a:endParaRPr lang="en-US"/>
           </a:p>
@@ -2458,7 +2479,7 @@
           <a:p>
             <a:fld id="{A980CFCE-CCF4-4BEA-8DA1-0DCFE03AA282}" type="datetimeFigureOut">
               <a:rPr lang="en-US" smtClean="0"/>
-              <a:t>8/3/2017</a:t>
+              <a:t>8/10/2017</a:t>
             </a:fld>
             <a:endParaRPr lang="en-US"/>
           </a:p>
@@ -2638,7 +2659,7 @@
           <a:p>
             <a:fld id="{A980CFCE-CCF4-4BEA-8DA1-0DCFE03AA282}" type="datetimeFigureOut">
               <a:rPr lang="en-US" smtClean="0"/>
-              <a:t>8/3/2017</a:t>
+              <a:t>8/10/2017</a:t>
             </a:fld>
             <a:endParaRPr lang="en-US"/>
           </a:p>
@@ -2808,7 +2829,7 @@
           <a:p>
             <a:fld id="{A980CFCE-CCF4-4BEA-8DA1-0DCFE03AA282}" type="datetimeFigureOut">
               <a:rPr lang="en-US" smtClean="0"/>
-              <a:t>8/3/2017</a:t>
+              <a:t>8/10/2017</a:t>
             </a:fld>
             <a:endParaRPr lang="en-US"/>
           </a:p>
@@ -3058,7 +3079,7 @@
           <a:p>
             <a:fld id="{A980CFCE-CCF4-4BEA-8DA1-0DCFE03AA282}" type="datetimeFigureOut">
               <a:rPr lang="en-US" smtClean="0"/>
-              <a:t>8/3/2017</a:t>
+              <a:t>8/10/2017</a:t>
             </a:fld>
             <a:endParaRPr lang="en-US"/>
           </a:p>
@@ -3294,7 +3315,7 @@
           <a:p>
             <a:fld id="{A980CFCE-CCF4-4BEA-8DA1-0DCFE03AA282}" type="datetimeFigureOut">
               <a:rPr lang="en-US" smtClean="0"/>
-              <a:t>8/3/2017</a:t>
+              <a:t>8/10/2017</a:t>
             </a:fld>
             <a:endParaRPr lang="en-US"/>
           </a:p>
@@ -3676,7 +3697,7 @@
           <a:p>
             <a:fld id="{A980CFCE-CCF4-4BEA-8DA1-0DCFE03AA282}" type="datetimeFigureOut">
               <a:rPr lang="en-US" smtClean="0"/>
-              <a:t>8/3/2017</a:t>
+              <a:t>8/10/2017</a:t>
             </a:fld>
             <a:endParaRPr lang="en-US"/>
           </a:p>
@@ -3794,7 +3815,7 @@
           <a:p>
             <a:fld id="{A980CFCE-CCF4-4BEA-8DA1-0DCFE03AA282}" type="datetimeFigureOut">
               <a:rPr lang="en-US" smtClean="0"/>
-              <a:t>8/3/2017</a:t>
+              <a:t>8/10/2017</a:t>
             </a:fld>
             <a:endParaRPr lang="en-US"/>
           </a:p>
@@ -3889,7 +3910,7 @@
           <a:p>
             <a:fld id="{A980CFCE-CCF4-4BEA-8DA1-0DCFE03AA282}" type="datetimeFigureOut">
               <a:rPr lang="en-US" smtClean="0"/>
-              <a:t>8/3/2017</a:t>
+              <a:t>8/10/2017</a:t>
             </a:fld>
             <a:endParaRPr lang="en-US"/>
           </a:p>
@@ -4144,7 +4165,7 @@
           <a:p>
             <a:fld id="{A980CFCE-CCF4-4BEA-8DA1-0DCFE03AA282}" type="datetimeFigureOut">
               <a:rPr lang="en-US" smtClean="0"/>
-              <a:t>8/3/2017</a:t>
+              <a:t>8/10/2017</a:t>
             </a:fld>
             <a:endParaRPr lang="en-US"/>
           </a:p>
@@ -4427,7 +4448,7 @@
           <a:p>
             <a:fld id="{A980CFCE-CCF4-4BEA-8DA1-0DCFE03AA282}" type="datetimeFigureOut">
               <a:rPr lang="en-US" smtClean="0"/>
-              <a:t>8/3/2017</a:t>
+              <a:t>8/10/2017</a:t>
             </a:fld>
             <a:endParaRPr lang="en-US"/>
           </a:p>
@@ -4833,7 +4854,7 @@
           <a:p>
             <a:fld id="{A980CFCE-CCF4-4BEA-8DA1-0DCFE03AA282}" type="datetimeFigureOut">
               <a:rPr lang="en-US" smtClean="0"/>
-              <a:t>8/3/2017</a:t>
+              <a:t>8/10/2017</a:t>
             </a:fld>
             <a:endParaRPr lang="en-US"/>
           </a:p>
@@ -5455,6 +5476,870 @@
 </p:sld>
 </file>
 
+<file path=ppt/slides/slide10.xml><?xml version="1.0" encoding="utf-8"?>
+<p:sld xmlns:a="http://schemas.openxmlformats.org/drawingml/2006/main" xmlns:r="http://schemas.openxmlformats.org/officeDocument/2006/relationships" xmlns:p="http://schemas.openxmlformats.org/presentationml/2006/main">
+  <p:cSld>
+    <p:spTree>
+      <p:nvGrpSpPr>
+        <p:cNvPr id="1" name=""/>
+        <p:cNvGrpSpPr/>
+        <p:nvPr/>
+      </p:nvGrpSpPr>
+      <p:grpSpPr>
+        <a:xfrm>
+          <a:off x="0" y="0"/>
+          <a:ext cx="0" cy="0"/>
+          <a:chOff x="0" y="0"/>
+          <a:chExt cx="0" cy="0"/>
+        </a:xfrm>
+      </p:grpSpPr>
+      <p:sp>
+        <p:nvSpPr>
+          <p:cNvPr id="4" name="Title 3">
+            <a:extLst>
+              <a:ext uri="{FF2B5EF4-FFF2-40B4-BE49-F238E27FC236}">
+                <a16:creationId xmlns:a16="http://schemas.microsoft.com/office/drawing/2014/main" id="{DC5BD1B1-F5AE-4DF8-9FA4-66D4AD098F49}"/>
+              </a:ext>
+            </a:extLst>
+          </p:cNvPr>
+          <p:cNvSpPr>
+            <a:spLocks noGrp="1"/>
+          </p:cNvSpPr>
+          <p:nvPr>
+            <p:ph type="title"/>
+          </p:nvPr>
+        </p:nvSpPr>
+        <p:spPr/>
+        <p:txBody>
+          <a:bodyPr/>
+          <a:lstStyle/>
+          <a:p>
+            <a:r>
+              <a:rPr lang="en-US" dirty="0"/>
+              <a:t>Acceleration</a:t>
+            </a:r>
+          </a:p>
+        </p:txBody>
+      </p:sp>
+      <p:sp>
+        <p:nvSpPr>
+          <p:cNvPr id="5" name="Content Placeholder 4">
+            <a:extLst>
+              <a:ext uri="{FF2B5EF4-FFF2-40B4-BE49-F238E27FC236}">
+                <a16:creationId xmlns:a16="http://schemas.microsoft.com/office/drawing/2014/main" id="{7C1B9B73-9D81-43F9-A52D-B95C9F125612}"/>
+              </a:ext>
+            </a:extLst>
+          </p:cNvPr>
+          <p:cNvSpPr>
+            <a:spLocks noGrp="1"/>
+          </p:cNvSpPr>
+          <p:nvPr>
+            <p:ph idx="1"/>
+          </p:nvPr>
+        </p:nvSpPr>
+        <p:spPr/>
+        <p:txBody>
+          <a:bodyPr/>
+          <a:lstStyle/>
+          <a:p>
+            <a:endParaRPr lang="en-US"/>
+          </a:p>
+        </p:txBody>
+      </p:sp>
+      <p:sp>
+        <p:nvSpPr>
+          <p:cNvPr id="6" name="Text Placeholder 5">
+            <a:extLst>
+              <a:ext uri="{FF2B5EF4-FFF2-40B4-BE49-F238E27FC236}">
+                <a16:creationId xmlns:a16="http://schemas.microsoft.com/office/drawing/2014/main" id="{A2979AAA-1EF5-413C-A772-48857317481A}"/>
+              </a:ext>
+            </a:extLst>
+          </p:cNvPr>
+          <p:cNvSpPr>
+            <a:spLocks noGrp="1"/>
+          </p:cNvSpPr>
+          <p:nvPr>
+            <p:ph type="body" sz="half" idx="2"/>
+          </p:nvPr>
+        </p:nvSpPr>
+        <p:spPr>
+          <a:xfrm>
+            <a:off x="7085011" y="2209799"/>
+            <a:ext cx="3842633" cy="2091267"/>
+          </a:xfrm>
+        </p:spPr>
+        <p:txBody>
+          <a:bodyPr>
+            <a:normAutofit/>
+          </a:bodyPr>
+          <a:lstStyle/>
+          <a:p>
+            <a:r>
+              <a:rPr lang="en-US" dirty="0"/>
+              <a:t>Vehicles accelerate 30% from a steady state.</a:t>
+            </a:r>
+          </a:p>
+        </p:txBody>
+      </p:sp>
+    </p:spTree>
+    <p:extLst>
+      <p:ext uri="{BB962C8B-B14F-4D97-AF65-F5344CB8AC3E}">
+        <p14:creationId xmlns:p14="http://schemas.microsoft.com/office/powerpoint/2010/main" val="2091567011"/>
+      </p:ext>
+    </p:extLst>
+  </p:cSld>
+  <p:clrMapOvr>
+    <a:masterClrMapping/>
+  </p:clrMapOvr>
+</p:sld>
+</file>
+
+<file path=ppt/slides/slide11.xml><?xml version="1.0" encoding="utf-8"?>
+<p:sld xmlns:a="http://schemas.openxmlformats.org/drawingml/2006/main" xmlns:r="http://schemas.openxmlformats.org/officeDocument/2006/relationships" xmlns:p="http://schemas.openxmlformats.org/presentationml/2006/main">
+  <p:cSld>
+    <p:spTree>
+      <p:nvGrpSpPr>
+        <p:cNvPr id="1" name=""/>
+        <p:cNvGrpSpPr/>
+        <p:nvPr/>
+      </p:nvGrpSpPr>
+      <p:grpSpPr>
+        <a:xfrm>
+          <a:off x="0" y="0"/>
+          <a:ext cx="0" cy="0"/>
+          <a:chOff x="0" y="0"/>
+          <a:chExt cx="0" cy="0"/>
+        </a:xfrm>
+      </p:grpSpPr>
+      <p:sp>
+        <p:nvSpPr>
+          <p:cNvPr id="2" name="Title 1">
+            <a:extLst>
+              <a:ext uri="{FF2B5EF4-FFF2-40B4-BE49-F238E27FC236}">
+                <a16:creationId xmlns:a16="http://schemas.microsoft.com/office/drawing/2014/main" id="{B4BBA801-1063-47CB-908F-0943323AD51A}"/>
+              </a:ext>
+            </a:extLst>
+          </p:cNvPr>
+          <p:cNvSpPr>
+            <a:spLocks noGrp="1"/>
+          </p:cNvSpPr>
+          <p:nvPr>
+            <p:ph type="title"/>
+          </p:nvPr>
+        </p:nvSpPr>
+        <p:spPr/>
+        <p:txBody>
+          <a:bodyPr/>
+          <a:lstStyle/>
+          <a:p>
+            <a:r>
+              <a:rPr lang="en-US" dirty="0"/>
+              <a:t>accelerating from Rest</a:t>
+            </a:r>
+          </a:p>
+        </p:txBody>
+      </p:sp>
+      <p:sp>
+        <p:nvSpPr>
+          <p:cNvPr id="3" name="Content Placeholder 2">
+            <a:extLst>
+              <a:ext uri="{FF2B5EF4-FFF2-40B4-BE49-F238E27FC236}">
+                <a16:creationId xmlns:a16="http://schemas.microsoft.com/office/drawing/2014/main" id="{88E824FC-3CEA-4F0F-86A2-9B17AE9D5266}"/>
+              </a:ext>
+            </a:extLst>
+          </p:cNvPr>
+          <p:cNvSpPr>
+            <a:spLocks noGrp="1"/>
+          </p:cNvSpPr>
+          <p:nvPr>
+            <p:ph idx="1"/>
+          </p:nvPr>
+        </p:nvSpPr>
+        <p:spPr/>
+        <p:txBody>
+          <a:bodyPr/>
+          <a:lstStyle/>
+          <a:p>
+            <a:endParaRPr lang="en-US"/>
+          </a:p>
+        </p:txBody>
+      </p:sp>
+      <p:sp>
+        <p:nvSpPr>
+          <p:cNvPr id="4" name="Text Placeholder 3">
+            <a:extLst>
+              <a:ext uri="{FF2B5EF4-FFF2-40B4-BE49-F238E27FC236}">
+                <a16:creationId xmlns:a16="http://schemas.microsoft.com/office/drawing/2014/main" id="{21508B5B-6690-41A4-8FD8-E2CF732443EA}"/>
+              </a:ext>
+            </a:extLst>
+          </p:cNvPr>
+          <p:cNvSpPr>
+            <a:spLocks noGrp="1"/>
+          </p:cNvSpPr>
+          <p:nvPr>
+            <p:ph type="body" sz="half" idx="2"/>
+          </p:nvPr>
+        </p:nvSpPr>
+        <p:spPr/>
+        <p:txBody>
+          <a:bodyPr/>
+          <a:lstStyle/>
+          <a:p>
+            <a:r>
+              <a:rPr lang="en-US" dirty="0"/>
+              <a:t>Lane of cars accelerate to 42 m/s from rest.</a:t>
+            </a:r>
+          </a:p>
+        </p:txBody>
+      </p:sp>
+    </p:spTree>
+    <p:extLst>
+      <p:ext uri="{BB962C8B-B14F-4D97-AF65-F5344CB8AC3E}">
+        <p14:creationId xmlns:p14="http://schemas.microsoft.com/office/powerpoint/2010/main" val="2941660981"/>
+      </p:ext>
+    </p:extLst>
+  </p:cSld>
+  <p:clrMapOvr>
+    <a:masterClrMapping/>
+  </p:clrMapOvr>
+</p:sld>
+</file>
+
+<file path=ppt/slides/slide12.xml><?xml version="1.0" encoding="utf-8"?>
+<p:sld xmlns:a="http://schemas.openxmlformats.org/drawingml/2006/main" xmlns:r="http://schemas.openxmlformats.org/officeDocument/2006/relationships" xmlns:p="http://schemas.openxmlformats.org/presentationml/2006/main">
+  <p:cSld>
+    <p:spTree>
+      <p:nvGrpSpPr>
+        <p:cNvPr id="1" name=""/>
+        <p:cNvGrpSpPr/>
+        <p:nvPr/>
+      </p:nvGrpSpPr>
+      <p:grpSpPr>
+        <a:xfrm>
+          <a:off x="0" y="0"/>
+          <a:ext cx="0" cy="0"/>
+          <a:chOff x="0" y="0"/>
+          <a:chExt cx="0" cy="0"/>
+        </a:xfrm>
+      </p:grpSpPr>
+      <p:sp>
+        <p:nvSpPr>
+          <p:cNvPr id="2" name="Title 1">
+            <a:extLst>
+              <a:ext uri="{FF2B5EF4-FFF2-40B4-BE49-F238E27FC236}">
+                <a16:creationId xmlns:a16="http://schemas.microsoft.com/office/drawing/2014/main" id="{F54C73EE-DC16-4636-BEC0-5C32259C1EFD}"/>
+              </a:ext>
+            </a:extLst>
+          </p:cNvPr>
+          <p:cNvSpPr>
+            <a:spLocks noGrp="1"/>
+          </p:cNvSpPr>
+          <p:nvPr>
+            <p:ph type="title"/>
+          </p:nvPr>
+        </p:nvSpPr>
+        <p:spPr/>
+        <p:txBody>
+          <a:bodyPr/>
+          <a:lstStyle/>
+          <a:p>
+            <a:r>
+              <a:rPr lang="en-US" dirty="0"/>
+              <a:t>Decelerating to a stop</a:t>
+            </a:r>
+          </a:p>
+        </p:txBody>
+      </p:sp>
+      <p:sp>
+        <p:nvSpPr>
+          <p:cNvPr id="3" name="Content Placeholder 2">
+            <a:extLst>
+              <a:ext uri="{FF2B5EF4-FFF2-40B4-BE49-F238E27FC236}">
+                <a16:creationId xmlns:a16="http://schemas.microsoft.com/office/drawing/2014/main" id="{F1BDDED8-AE58-4121-ABEE-E46740C170D2}"/>
+              </a:ext>
+            </a:extLst>
+          </p:cNvPr>
+          <p:cNvSpPr>
+            <a:spLocks noGrp="1"/>
+          </p:cNvSpPr>
+          <p:nvPr>
+            <p:ph idx="1"/>
+          </p:nvPr>
+        </p:nvSpPr>
+        <p:spPr/>
+        <p:txBody>
+          <a:bodyPr/>
+          <a:lstStyle/>
+          <a:p>
+            <a:endParaRPr lang="en-US"/>
+          </a:p>
+        </p:txBody>
+      </p:sp>
+      <p:sp>
+        <p:nvSpPr>
+          <p:cNvPr id="4" name="Text Placeholder 3">
+            <a:extLst>
+              <a:ext uri="{FF2B5EF4-FFF2-40B4-BE49-F238E27FC236}">
+                <a16:creationId xmlns:a16="http://schemas.microsoft.com/office/drawing/2014/main" id="{025AF43A-E84A-46D4-A255-C84245D142F5}"/>
+              </a:ext>
+            </a:extLst>
+          </p:cNvPr>
+          <p:cNvSpPr>
+            <a:spLocks noGrp="1"/>
+          </p:cNvSpPr>
+          <p:nvPr>
+            <p:ph type="body" sz="half" idx="2"/>
+          </p:nvPr>
+        </p:nvSpPr>
+        <p:spPr/>
+        <p:txBody>
+          <a:bodyPr/>
+          <a:lstStyle/>
+          <a:p>
+            <a:r>
+              <a:rPr lang="en-US" dirty="0"/>
+              <a:t>Line of vehicles decelerates to rest at their maximum braking power. </a:t>
+            </a:r>
+          </a:p>
+        </p:txBody>
+      </p:sp>
+    </p:spTree>
+    <p:extLst>
+      <p:ext uri="{BB962C8B-B14F-4D97-AF65-F5344CB8AC3E}">
+        <p14:creationId xmlns:p14="http://schemas.microsoft.com/office/powerpoint/2010/main" val="3638549261"/>
+      </p:ext>
+    </p:extLst>
+  </p:cSld>
+  <p:clrMapOvr>
+    <a:masterClrMapping/>
+  </p:clrMapOvr>
+</p:sld>
+</file>
+
+<file path=ppt/slides/slide13.xml><?xml version="1.0" encoding="utf-8"?>
+<p:sld xmlns:a="http://schemas.openxmlformats.org/drawingml/2006/main" xmlns:r="http://schemas.openxmlformats.org/officeDocument/2006/relationships" xmlns:p="http://schemas.openxmlformats.org/presentationml/2006/main">
+  <p:cSld>
+    <p:spTree>
+      <p:nvGrpSpPr>
+        <p:cNvPr id="1" name=""/>
+        <p:cNvGrpSpPr/>
+        <p:nvPr/>
+      </p:nvGrpSpPr>
+      <p:grpSpPr>
+        <a:xfrm>
+          <a:off x="0" y="0"/>
+          <a:ext cx="0" cy="0"/>
+          <a:chOff x="0" y="0"/>
+          <a:chExt cx="0" cy="0"/>
+        </a:xfrm>
+      </p:grpSpPr>
+      <p:sp>
+        <p:nvSpPr>
+          <p:cNvPr id="5" name="Title 4">
+            <a:extLst>
+              <a:ext uri="{FF2B5EF4-FFF2-40B4-BE49-F238E27FC236}">
+                <a16:creationId xmlns:a16="http://schemas.microsoft.com/office/drawing/2014/main" id="{BCC30204-F1F9-4A99-B7C0-E1A2DFE995CD}"/>
+              </a:ext>
+            </a:extLst>
+          </p:cNvPr>
+          <p:cNvSpPr>
+            <a:spLocks noGrp="1"/>
+          </p:cNvSpPr>
+          <p:nvPr>
+            <p:ph type="title"/>
+          </p:nvPr>
+        </p:nvSpPr>
+        <p:spPr/>
+        <p:txBody>
+          <a:bodyPr/>
+          <a:lstStyle/>
+          <a:p>
+            <a:r>
+              <a:rPr lang="en-US" dirty="0"/>
+              <a:t>Changing initial position (Broad)</a:t>
+            </a:r>
+          </a:p>
+        </p:txBody>
+      </p:sp>
+      <p:sp>
+        <p:nvSpPr>
+          <p:cNvPr id="6" name="Content Placeholder 5">
+            <a:extLst>
+              <a:ext uri="{FF2B5EF4-FFF2-40B4-BE49-F238E27FC236}">
+                <a16:creationId xmlns:a16="http://schemas.microsoft.com/office/drawing/2014/main" id="{ED14A511-87A0-47B7-A024-F5A3FAE2D6CE}"/>
+              </a:ext>
+            </a:extLst>
+          </p:cNvPr>
+          <p:cNvSpPr>
+            <a:spLocks noGrp="1"/>
+          </p:cNvSpPr>
+          <p:nvPr>
+            <p:ph idx="1"/>
+          </p:nvPr>
+        </p:nvSpPr>
+        <p:spPr/>
+        <p:txBody>
+          <a:bodyPr/>
+          <a:lstStyle/>
+          <a:p>
+            <a:endParaRPr lang="en-US"/>
+          </a:p>
+        </p:txBody>
+      </p:sp>
+    </p:spTree>
+    <p:extLst>
+      <p:ext uri="{BB962C8B-B14F-4D97-AF65-F5344CB8AC3E}">
+        <p14:creationId xmlns:p14="http://schemas.microsoft.com/office/powerpoint/2010/main" val="1533433442"/>
+      </p:ext>
+    </p:extLst>
+  </p:cSld>
+  <p:clrMapOvr>
+    <a:masterClrMapping/>
+  </p:clrMapOvr>
+</p:sld>
+</file>
+
+<file path=ppt/slides/slide14.xml><?xml version="1.0" encoding="utf-8"?>
+<p:sld xmlns:a="http://schemas.openxmlformats.org/drawingml/2006/main" xmlns:r="http://schemas.openxmlformats.org/officeDocument/2006/relationships" xmlns:p="http://schemas.openxmlformats.org/presentationml/2006/main">
+  <p:cSld>
+    <p:spTree>
+      <p:nvGrpSpPr>
+        <p:cNvPr id="1" name=""/>
+        <p:cNvGrpSpPr/>
+        <p:nvPr/>
+      </p:nvGrpSpPr>
+      <p:grpSpPr>
+        <a:xfrm>
+          <a:off x="0" y="0"/>
+          <a:ext cx="0" cy="0"/>
+          <a:chOff x="0" y="0"/>
+          <a:chExt cx="0" cy="0"/>
+        </a:xfrm>
+      </p:grpSpPr>
+      <p:sp>
+        <p:nvSpPr>
+          <p:cNvPr id="2" name="Title 1">
+            <a:extLst>
+              <a:ext uri="{FF2B5EF4-FFF2-40B4-BE49-F238E27FC236}">
+                <a16:creationId xmlns:a16="http://schemas.microsoft.com/office/drawing/2014/main" id="{3219771C-91D4-42DA-9E52-F14FBE2A20F1}"/>
+              </a:ext>
+            </a:extLst>
+          </p:cNvPr>
+          <p:cNvSpPr>
+            <a:spLocks noGrp="1"/>
+          </p:cNvSpPr>
+          <p:nvPr>
+            <p:ph type="title"/>
+          </p:nvPr>
+        </p:nvSpPr>
+        <p:spPr/>
+        <p:txBody>
+          <a:bodyPr/>
+          <a:lstStyle/>
+          <a:p>
+            <a:r>
+              <a:rPr lang="en-US" dirty="0"/>
+              <a:t>Changing initial position </a:t>
+            </a:r>
+            <a:br>
+              <a:rPr lang="en-US" dirty="0"/>
+            </a:br>
+            <a:r>
+              <a:rPr lang="en-US" dirty="0"/>
+              <a:t>(fine)</a:t>
+            </a:r>
+          </a:p>
+        </p:txBody>
+      </p:sp>
+      <p:sp>
+        <p:nvSpPr>
+          <p:cNvPr id="3" name="Content Placeholder 2">
+            <a:extLst>
+              <a:ext uri="{FF2B5EF4-FFF2-40B4-BE49-F238E27FC236}">
+                <a16:creationId xmlns:a16="http://schemas.microsoft.com/office/drawing/2014/main" id="{B454CCFC-5038-472C-A9C4-2DA1304026D6}"/>
+              </a:ext>
+            </a:extLst>
+          </p:cNvPr>
+          <p:cNvSpPr>
+            <a:spLocks noGrp="1"/>
+          </p:cNvSpPr>
+          <p:nvPr>
+            <p:ph idx="1"/>
+          </p:nvPr>
+        </p:nvSpPr>
+        <p:spPr/>
+        <p:txBody>
+          <a:bodyPr/>
+          <a:lstStyle/>
+          <a:p>
+            <a:endParaRPr lang="en-US" dirty="0"/>
+          </a:p>
+        </p:txBody>
+      </p:sp>
+    </p:spTree>
+    <p:extLst>
+      <p:ext uri="{BB962C8B-B14F-4D97-AF65-F5344CB8AC3E}">
+        <p14:creationId xmlns:p14="http://schemas.microsoft.com/office/powerpoint/2010/main" val="3211275904"/>
+      </p:ext>
+    </p:extLst>
+  </p:cSld>
+  <p:clrMapOvr>
+    <a:masterClrMapping/>
+  </p:clrMapOvr>
+</p:sld>
+</file>
+
+<file path=ppt/slides/slide15.xml><?xml version="1.0" encoding="utf-8"?>
+<p:sld xmlns:a="http://schemas.openxmlformats.org/drawingml/2006/main" xmlns:r="http://schemas.openxmlformats.org/officeDocument/2006/relationships" xmlns:p="http://schemas.openxmlformats.org/presentationml/2006/main">
+  <p:cSld>
+    <p:spTree>
+      <p:nvGrpSpPr>
+        <p:cNvPr id="1" name=""/>
+        <p:cNvGrpSpPr/>
+        <p:nvPr/>
+      </p:nvGrpSpPr>
+      <p:grpSpPr>
+        <a:xfrm>
+          <a:off x="0" y="0"/>
+          <a:ext cx="0" cy="0"/>
+          <a:chOff x="0" y="0"/>
+          <a:chExt cx="0" cy="0"/>
+        </a:xfrm>
+      </p:grpSpPr>
+      <p:sp>
+        <p:nvSpPr>
+          <p:cNvPr id="2" name="Title 1">
+            <a:extLst>
+              <a:ext uri="{FF2B5EF4-FFF2-40B4-BE49-F238E27FC236}">
+                <a16:creationId xmlns:a16="http://schemas.microsoft.com/office/drawing/2014/main" id="{A488C123-489C-44A0-885B-ED35D9A0A1B7}"/>
+              </a:ext>
+            </a:extLst>
+          </p:cNvPr>
+          <p:cNvSpPr>
+            <a:spLocks noGrp="1"/>
+          </p:cNvSpPr>
+          <p:nvPr>
+            <p:ph type="title"/>
+          </p:nvPr>
+        </p:nvSpPr>
+        <p:spPr/>
+        <p:txBody>
+          <a:bodyPr/>
+          <a:lstStyle/>
+          <a:p>
+            <a:r>
+              <a:rPr lang="en-US" dirty="0"/>
+              <a:t>Changing lambda</a:t>
+            </a:r>
+          </a:p>
+        </p:txBody>
+      </p:sp>
+      <p:sp>
+        <p:nvSpPr>
+          <p:cNvPr id="3" name="Content Placeholder 2">
+            <a:extLst>
+              <a:ext uri="{FF2B5EF4-FFF2-40B4-BE49-F238E27FC236}">
+                <a16:creationId xmlns:a16="http://schemas.microsoft.com/office/drawing/2014/main" id="{AA80251E-B43B-4981-8EB4-53EB6550B3F3}"/>
+              </a:ext>
+            </a:extLst>
+          </p:cNvPr>
+          <p:cNvSpPr>
+            <a:spLocks noGrp="1"/>
+          </p:cNvSpPr>
+          <p:nvPr>
+            <p:ph idx="1"/>
+          </p:nvPr>
+        </p:nvSpPr>
+        <p:spPr/>
+        <p:txBody>
+          <a:bodyPr/>
+          <a:lstStyle/>
+          <a:p>
+            <a:endParaRPr lang="en-US"/>
+          </a:p>
+        </p:txBody>
+      </p:sp>
+    </p:spTree>
+    <p:extLst>
+      <p:ext uri="{BB962C8B-B14F-4D97-AF65-F5344CB8AC3E}">
+        <p14:creationId xmlns:p14="http://schemas.microsoft.com/office/powerpoint/2010/main" val="2143980199"/>
+      </p:ext>
+    </p:extLst>
+  </p:cSld>
+  <p:clrMapOvr>
+    <a:masterClrMapping/>
+  </p:clrMapOvr>
+</p:sld>
+</file>
+
+<file path=ppt/slides/slide16.xml><?xml version="1.0" encoding="utf-8"?>
+<p:sld xmlns:a="http://schemas.openxmlformats.org/drawingml/2006/main" xmlns:r="http://schemas.openxmlformats.org/officeDocument/2006/relationships" xmlns:p="http://schemas.openxmlformats.org/presentationml/2006/main">
+  <p:cSld>
+    <p:spTree>
+      <p:nvGrpSpPr>
+        <p:cNvPr id="1" name=""/>
+        <p:cNvGrpSpPr/>
+        <p:nvPr/>
+      </p:nvGrpSpPr>
+      <p:grpSpPr>
+        <a:xfrm>
+          <a:off x="0" y="0"/>
+          <a:ext cx="0" cy="0"/>
+          <a:chOff x="0" y="0"/>
+          <a:chExt cx="0" cy="0"/>
+        </a:xfrm>
+      </p:grpSpPr>
+      <p:sp>
+        <p:nvSpPr>
+          <p:cNvPr id="2" name="Title 1">
+            <a:extLst>
+              <a:ext uri="{FF2B5EF4-FFF2-40B4-BE49-F238E27FC236}">
+                <a16:creationId xmlns:a16="http://schemas.microsoft.com/office/drawing/2014/main" id="{828FBE6E-4197-4D36-915F-AA0E9B4B217F}"/>
+              </a:ext>
+            </a:extLst>
+          </p:cNvPr>
+          <p:cNvSpPr>
+            <a:spLocks noGrp="1"/>
+          </p:cNvSpPr>
+          <p:nvPr>
+            <p:ph type="title"/>
+          </p:nvPr>
+        </p:nvSpPr>
+        <p:spPr/>
+        <p:txBody>
+          <a:bodyPr/>
+          <a:lstStyle/>
+          <a:p>
+            <a:r>
+              <a:rPr lang="en-US" dirty="0"/>
+              <a:t>Comparing conventional vs optimized traffic</a:t>
+            </a:r>
+          </a:p>
+        </p:txBody>
+      </p:sp>
+      <p:sp>
+        <p:nvSpPr>
+          <p:cNvPr id="3" name="Content Placeholder 2">
+            <a:extLst>
+              <a:ext uri="{FF2B5EF4-FFF2-40B4-BE49-F238E27FC236}">
+                <a16:creationId xmlns:a16="http://schemas.microsoft.com/office/drawing/2014/main" id="{213830E0-2688-4DB4-BA59-7435E9459254}"/>
+              </a:ext>
+            </a:extLst>
+          </p:cNvPr>
+          <p:cNvSpPr>
+            <a:spLocks noGrp="1"/>
+          </p:cNvSpPr>
+          <p:nvPr>
+            <p:ph idx="1"/>
+          </p:nvPr>
+        </p:nvSpPr>
+        <p:spPr/>
+        <p:txBody>
+          <a:bodyPr/>
+          <a:lstStyle/>
+          <a:p>
+            <a:endParaRPr lang="en-US"/>
+          </a:p>
+        </p:txBody>
+      </p:sp>
+    </p:spTree>
+    <p:extLst>
+      <p:ext uri="{BB962C8B-B14F-4D97-AF65-F5344CB8AC3E}">
+        <p14:creationId xmlns:p14="http://schemas.microsoft.com/office/powerpoint/2010/main" val="714239625"/>
+      </p:ext>
+    </p:extLst>
+  </p:cSld>
+  <p:clrMapOvr>
+    <a:masterClrMapping/>
+  </p:clrMapOvr>
+</p:sld>
+</file>
+
+<file path=ppt/slides/slide17.xml><?xml version="1.0" encoding="utf-8"?>
+<p:sld xmlns:a="http://schemas.openxmlformats.org/drawingml/2006/main" xmlns:r="http://schemas.openxmlformats.org/officeDocument/2006/relationships" xmlns:p="http://schemas.openxmlformats.org/presentationml/2006/main">
+  <p:cSld>
+    <p:spTree>
+      <p:nvGrpSpPr>
+        <p:cNvPr id="1" name=""/>
+        <p:cNvGrpSpPr/>
+        <p:nvPr/>
+      </p:nvGrpSpPr>
+      <p:grpSpPr>
+        <a:xfrm>
+          <a:off x="0" y="0"/>
+          <a:ext cx="0" cy="0"/>
+          <a:chOff x="0" y="0"/>
+          <a:chExt cx="0" cy="0"/>
+        </a:xfrm>
+      </p:grpSpPr>
+      <p:sp>
+        <p:nvSpPr>
+          <p:cNvPr id="2" name="Title 1">
+            <a:extLst>
+              <a:ext uri="{FF2B5EF4-FFF2-40B4-BE49-F238E27FC236}">
+                <a16:creationId xmlns:a16="http://schemas.microsoft.com/office/drawing/2014/main" id="{4C825A7D-9B15-4F95-8A94-3FE6160A83D0}"/>
+              </a:ext>
+            </a:extLst>
+          </p:cNvPr>
+          <p:cNvSpPr>
+            <a:spLocks noGrp="1"/>
+          </p:cNvSpPr>
+          <p:nvPr>
+            <p:ph type="title"/>
+          </p:nvPr>
+        </p:nvSpPr>
+        <p:spPr/>
+        <p:txBody>
+          <a:bodyPr/>
+          <a:lstStyle/>
+          <a:p>
+            <a:r>
+              <a:rPr lang="en-US" dirty="0"/>
+              <a:t>Applications and future goals for program</a:t>
+            </a:r>
+          </a:p>
+        </p:txBody>
+      </p:sp>
+      <p:sp>
+        <p:nvSpPr>
+          <p:cNvPr id="3" name="Content Placeholder 2">
+            <a:extLst>
+              <a:ext uri="{FF2B5EF4-FFF2-40B4-BE49-F238E27FC236}">
+                <a16:creationId xmlns:a16="http://schemas.microsoft.com/office/drawing/2014/main" id="{507BDB00-F0E4-47A4-9D6C-845975C0053E}"/>
+              </a:ext>
+            </a:extLst>
+          </p:cNvPr>
+          <p:cNvSpPr>
+            <a:spLocks noGrp="1"/>
+          </p:cNvSpPr>
+          <p:nvPr>
+            <p:ph idx="1"/>
+          </p:nvPr>
+        </p:nvSpPr>
+        <p:spPr/>
+        <p:txBody>
+          <a:bodyPr/>
+          <a:lstStyle/>
+          <a:p>
+            <a:endParaRPr lang="en-US"/>
+          </a:p>
+        </p:txBody>
+      </p:sp>
+    </p:spTree>
+    <p:extLst>
+      <p:ext uri="{BB962C8B-B14F-4D97-AF65-F5344CB8AC3E}">
+        <p14:creationId xmlns:p14="http://schemas.microsoft.com/office/powerpoint/2010/main" val="93171038"/>
+      </p:ext>
+    </p:extLst>
+  </p:cSld>
+  <p:clrMapOvr>
+    <a:masterClrMapping/>
+  </p:clrMapOvr>
+</p:sld>
+</file>
+
+<file path=ppt/slides/slide18.xml><?xml version="1.0" encoding="utf-8"?>
+<p:sld xmlns:a="http://schemas.openxmlformats.org/drawingml/2006/main" xmlns:r="http://schemas.openxmlformats.org/officeDocument/2006/relationships" xmlns:p="http://schemas.openxmlformats.org/presentationml/2006/main">
+  <p:cSld>
+    <p:spTree>
+      <p:nvGrpSpPr>
+        <p:cNvPr id="1" name=""/>
+        <p:cNvGrpSpPr/>
+        <p:nvPr/>
+      </p:nvGrpSpPr>
+      <p:grpSpPr>
+        <a:xfrm>
+          <a:off x="0" y="0"/>
+          <a:ext cx="0" cy="0"/>
+          <a:chOff x="0" y="0"/>
+          <a:chExt cx="0" cy="0"/>
+        </a:xfrm>
+      </p:grpSpPr>
+      <p:sp>
+        <p:nvSpPr>
+          <p:cNvPr id="2" name="Title 1">
+            <a:extLst>
+              <a:ext uri="{FF2B5EF4-FFF2-40B4-BE49-F238E27FC236}">
+                <a16:creationId xmlns:a16="http://schemas.microsoft.com/office/drawing/2014/main" id="{A24BC822-ACB5-4E4F-8D7D-36C91923BE59}"/>
+              </a:ext>
+            </a:extLst>
+          </p:cNvPr>
+          <p:cNvSpPr>
+            <a:spLocks noGrp="1"/>
+          </p:cNvSpPr>
+          <p:nvPr>
+            <p:ph type="title"/>
+          </p:nvPr>
+        </p:nvSpPr>
+        <p:spPr>
+          <a:xfrm>
+            <a:off x="684212" y="412043"/>
+            <a:ext cx="8534400" cy="1507067"/>
+          </a:xfrm>
+        </p:spPr>
+        <p:txBody>
+          <a:bodyPr/>
+          <a:lstStyle/>
+          <a:p>
+            <a:r>
+              <a:rPr lang="en-US" dirty="0"/>
+              <a:t>Sources</a:t>
+            </a:r>
+          </a:p>
+        </p:txBody>
+      </p:sp>
+      <p:sp>
+        <p:nvSpPr>
+          <p:cNvPr id="3" name="Content Placeholder 2">
+            <a:extLst>
+              <a:ext uri="{FF2B5EF4-FFF2-40B4-BE49-F238E27FC236}">
+                <a16:creationId xmlns:a16="http://schemas.microsoft.com/office/drawing/2014/main" id="{013B9E11-83E9-45A6-A26C-F5F606A6F539}"/>
+              </a:ext>
+            </a:extLst>
+          </p:cNvPr>
+          <p:cNvSpPr>
+            <a:spLocks noGrp="1"/>
+          </p:cNvSpPr>
+          <p:nvPr>
+            <p:ph idx="1"/>
+          </p:nvPr>
+        </p:nvSpPr>
+        <p:spPr>
+          <a:xfrm>
+            <a:off x="684212" y="2379132"/>
+            <a:ext cx="8534400" cy="3615267"/>
+          </a:xfrm>
+        </p:spPr>
+        <p:txBody>
+          <a:bodyPr/>
+          <a:lstStyle/>
+          <a:p>
+            <a:r>
+              <a:rPr lang="en-US" dirty="0">
+                <a:hlinkClick r:id="rId2"/>
+              </a:rPr>
+              <a:t>https://www.michigan.gov/documents/msp/BrakeTesting-MSP_VehicleEval08_Web_221473_7.pdf</a:t>
+            </a:r>
+            <a:endParaRPr lang="en-US" dirty="0"/>
+          </a:p>
+          <a:p>
+            <a:endParaRPr lang="en-US" dirty="0"/>
+          </a:p>
+        </p:txBody>
+      </p:sp>
+    </p:spTree>
+    <p:extLst>
+      <p:ext uri="{BB962C8B-B14F-4D97-AF65-F5344CB8AC3E}">
+        <p14:creationId xmlns:p14="http://schemas.microsoft.com/office/powerpoint/2010/main" val="3282756331"/>
+      </p:ext>
+    </p:extLst>
+  </p:cSld>
+  <p:clrMapOvr>
+    <a:masterClrMapping/>
+  </p:clrMapOvr>
+</p:sld>
+</file>
+
 <file path=ppt/slides/slide2.xml><?xml version="1.0" encoding="utf-8"?>
 <p:sld xmlns:a="http://schemas.openxmlformats.org/drawingml/2006/main" xmlns:r="http://schemas.openxmlformats.org/officeDocument/2006/relationships" xmlns:p="http://schemas.openxmlformats.org/presentationml/2006/main">
   <p:cSld>
@@ -5477,7 +6362,7 @@
           <p:cNvPr id="2" name="Title 1">
             <a:extLst>
               <a:ext uri="{FF2B5EF4-FFF2-40B4-BE49-F238E27FC236}">
-                <a16:creationId xmlns:a16="http://schemas.microsoft.com/office/drawing/2014/main" id="{A24BC822-ACB5-4E4F-8D7D-36C91923BE59}"/>
+                <a16:creationId xmlns:a16="http://schemas.microsoft.com/office/drawing/2014/main" id="{F197F9AE-A0FD-401C-B623-F3277E869609}"/>
               </a:ext>
             </a:extLst>
           </p:cNvPr>
@@ -5495,7 +6380,7 @@
           <a:p>
             <a:r>
               <a:rPr lang="en-US" dirty="0"/>
-              <a:t>Sources</a:t>
+              <a:t>Description</a:t>
             </a:r>
           </a:p>
         </p:txBody>
@@ -5505,7 +6390,7 @@
           <p:cNvPr id="3" name="Content Placeholder 2">
             <a:extLst>
               <a:ext uri="{FF2B5EF4-FFF2-40B4-BE49-F238E27FC236}">
-                <a16:creationId xmlns:a16="http://schemas.microsoft.com/office/drawing/2014/main" id="{013B9E11-83E9-45A6-A26C-F5F606A6F539}"/>
+                <a16:creationId xmlns:a16="http://schemas.microsoft.com/office/drawing/2014/main" id="{8710ABDA-C22E-4385-A6E5-BCA38C42B9A7}"/>
               </a:ext>
             </a:extLst>
           </p:cNvPr>
@@ -5522,22 +6407,665 @@
           <a:lstStyle/>
           <a:p>
             <a:r>
-              <a:rPr lang="en-US" dirty="0">
-                <a:hlinkClick r:id="rId2"/>
-              </a:rPr>
-              <a:t>https://www.michigan.gov/documents/msp/BrakeTesting-MSP_VehicleEval08_Web_221473_7.pdf</a:t>
-            </a:r>
-            <a:endParaRPr lang="en-US" dirty="0"/>
-          </a:p>
-          <a:p>
-            <a:endParaRPr lang="en-US" dirty="0"/>
+              <a:rPr lang="en-US" dirty="0"/>
+              <a:t>Model of Traffic Flow along a single lane.</a:t>
+            </a:r>
+          </a:p>
+          <a:p>
+            <a:r>
+              <a:rPr lang="en-US" dirty="0"/>
+              <a:t>Only the first vehicle varies</a:t>
+            </a:r>
+          </a:p>
+          <a:p>
+            <a:r>
+              <a:rPr lang="en-US" dirty="0"/>
+              <a:t>Following vehicle’s are dependent on the previous vehicles speed and a constant</a:t>
+            </a:r>
+          </a:p>
+          <a:p>
+            <a:r>
+              <a:rPr lang="en-US" dirty="0"/>
+              <a:t>Constant determined by user.</a:t>
+            </a:r>
           </a:p>
         </p:txBody>
       </p:sp>
     </p:spTree>
     <p:extLst>
       <p:ext uri="{BB962C8B-B14F-4D97-AF65-F5344CB8AC3E}">
-        <p14:creationId xmlns:p14="http://schemas.microsoft.com/office/powerpoint/2010/main" val="3282756331"/>
+        <p14:creationId xmlns:p14="http://schemas.microsoft.com/office/powerpoint/2010/main" val="185932680"/>
+      </p:ext>
+    </p:extLst>
+  </p:cSld>
+  <p:clrMapOvr>
+    <a:masterClrMapping/>
+  </p:clrMapOvr>
+</p:sld>
+</file>
+
+<file path=ppt/slides/slide3.xml><?xml version="1.0" encoding="utf-8"?>
+<p:sld xmlns:a="http://schemas.openxmlformats.org/drawingml/2006/main" xmlns:r="http://schemas.openxmlformats.org/officeDocument/2006/relationships" xmlns:p="http://schemas.openxmlformats.org/presentationml/2006/main">
+  <p:cSld>
+    <p:spTree>
+      <p:nvGrpSpPr>
+        <p:cNvPr id="1" name=""/>
+        <p:cNvGrpSpPr/>
+        <p:nvPr/>
+      </p:nvGrpSpPr>
+      <p:grpSpPr>
+        <a:xfrm>
+          <a:off x="0" y="0"/>
+          <a:ext cx="0" cy="0"/>
+          <a:chOff x="0" y="0"/>
+          <a:chExt cx="0" cy="0"/>
+        </a:xfrm>
+      </p:grpSpPr>
+      <p:sp>
+        <p:nvSpPr>
+          <p:cNvPr id="2" name="Title 1">
+            <a:extLst>
+              <a:ext uri="{FF2B5EF4-FFF2-40B4-BE49-F238E27FC236}">
+                <a16:creationId xmlns:a16="http://schemas.microsoft.com/office/drawing/2014/main" id="{AC50319A-E87A-4C7A-BC0B-3620C1971DFD}"/>
+              </a:ext>
+            </a:extLst>
+          </p:cNvPr>
+          <p:cNvSpPr>
+            <a:spLocks noGrp="1"/>
+          </p:cNvSpPr>
+          <p:nvPr>
+            <p:ph type="title"/>
+          </p:nvPr>
+        </p:nvSpPr>
+        <p:spPr/>
+        <p:txBody>
+          <a:bodyPr/>
+          <a:lstStyle/>
+          <a:p>
+            <a:r>
+              <a:rPr lang="en-US" dirty="0"/>
+              <a:t>Mathematics and equations</a:t>
+            </a:r>
+          </a:p>
+        </p:txBody>
+      </p:sp>
+      <p:sp>
+        <p:nvSpPr>
+          <p:cNvPr id="3" name="Content Placeholder 2">
+            <a:extLst>
+              <a:ext uri="{FF2B5EF4-FFF2-40B4-BE49-F238E27FC236}">
+                <a16:creationId xmlns:a16="http://schemas.microsoft.com/office/drawing/2014/main" id="{AD0E0B80-1D6B-45B9-993C-3FBE636BD09A}"/>
+              </a:ext>
+            </a:extLst>
+          </p:cNvPr>
+          <p:cNvSpPr>
+            <a:spLocks noGrp="1"/>
+          </p:cNvSpPr>
+          <p:nvPr>
+            <p:ph idx="1"/>
+          </p:nvPr>
+        </p:nvSpPr>
+        <p:spPr/>
+        <p:txBody>
+          <a:bodyPr/>
+          <a:lstStyle/>
+          <a:p>
+            <a:endParaRPr lang="en-US" dirty="0"/>
+          </a:p>
+        </p:txBody>
+      </p:sp>
+    </p:spTree>
+    <p:extLst>
+      <p:ext uri="{BB962C8B-B14F-4D97-AF65-F5344CB8AC3E}">
+        <p14:creationId xmlns:p14="http://schemas.microsoft.com/office/powerpoint/2010/main" val="2521276922"/>
+      </p:ext>
+    </p:extLst>
+  </p:cSld>
+  <p:clrMapOvr>
+    <a:masterClrMapping/>
+  </p:clrMapOvr>
+</p:sld>
+</file>
+
+<file path=ppt/slides/slide4.xml><?xml version="1.0" encoding="utf-8"?>
+<p:sld xmlns:a="http://schemas.openxmlformats.org/drawingml/2006/main" xmlns:r="http://schemas.openxmlformats.org/officeDocument/2006/relationships" xmlns:p="http://schemas.openxmlformats.org/presentationml/2006/main">
+  <p:cSld>
+    <p:spTree>
+      <p:nvGrpSpPr>
+        <p:cNvPr id="1" name=""/>
+        <p:cNvGrpSpPr/>
+        <p:nvPr/>
+      </p:nvGrpSpPr>
+      <p:grpSpPr>
+        <a:xfrm>
+          <a:off x="0" y="0"/>
+          <a:ext cx="0" cy="0"/>
+          <a:chOff x="0" y="0"/>
+          <a:chExt cx="0" cy="0"/>
+        </a:xfrm>
+      </p:grpSpPr>
+      <p:sp>
+        <p:nvSpPr>
+          <p:cNvPr id="2" name="Title 1">
+            <a:extLst>
+              <a:ext uri="{FF2B5EF4-FFF2-40B4-BE49-F238E27FC236}">
+                <a16:creationId xmlns:a16="http://schemas.microsoft.com/office/drawing/2014/main" id="{5F259330-1E98-49B4-8794-AA202D248DF9}"/>
+              </a:ext>
+            </a:extLst>
+          </p:cNvPr>
+          <p:cNvSpPr>
+            <a:spLocks noGrp="1"/>
+          </p:cNvSpPr>
+          <p:nvPr>
+            <p:ph type="title"/>
+          </p:nvPr>
+        </p:nvSpPr>
+        <p:spPr/>
+        <p:txBody>
+          <a:bodyPr/>
+          <a:lstStyle/>
+          <a:p>
+            <a:r>
+              <a:rPr lang="en-US" dirty="0"/>
+              <a:t>Runge-</a:t>
+            </a:r>
+            <a:r>
+              <a:rPr lang="en-US" dirty="0" err="1"/>
+              <a:t>kutta</a:t>
+            </a:r>
+            <a:r>
+              <a:rPr lang="en-US" dirty="0"/>
+              <a:t> 4</a:t>
+            </a:r>
+            <a:r>
+              <a:rPr lang="en-US" baseline="30000" dirty="0"/>
+              <a:t>th</a:t>
+            </a:r>
+            <a:r>
+              <a:rPr lang="en-US" dirty="0"/>
+              <a:t> Order</a:t>
+            </a:r>
+          </a:p>
+        </p:txBody>
+      </p:sp>
+      <p:sp>
+        <p:nvSpPr>
+          <p:cNvPr id="3" name="Content Placeholder 2">
+            <a:extLst>
+              <a:ext uri="{FF2B5EF4-FFF2-40B4-BE49-F238E27FC236}">
+                <a16:creationId xmlns:a16="http://schemas.microsoft.com/office/drawing/2014/main" id="{65F8BB66-8FDE-4AA5-92F8-BAD0F6E96883}"/>
+              </a:ext>
+            </a:extLst>
+          </p:cNvPr>
+          <p:cNvSpPr>
+            <a:spLocks noGrp="1"/>
+          </p:cNvSpPr>
+          <p:nvPr>
+            <p:ph idx="1"/>
+          </p:nvPr>
+        </p:nvSpPr>
+        <p:spPr/>
+        <p:txBody>
+          <a:bodyPr/>
+          <a:lstStyle/>
+          <a:p>
+            <a:endParaRPr lang="en-US"/>
+          </a:p>
+        </p:txBody>
+      </p:sp>
+    </p:spTree>
+    <p:extLst>
+      <p:ext uri="{BB962C8B-B14F-4D97-AF65-F5344CB8AC3E}">
+        <p14:creationId xmlns:p14="http://schemas.microsoft.com/office/powerpoint/2010/main" val="1824761607"/>
+      </p:ext>
+    </p:extLst>
+  </p:cSld>
+  <p:clrMapOvr>
+    <a:masterClrMapping/>
+  </p:clrMapOvr>
+</p:sld>
+</file>
+
+<file path=ppt/slides/slide5.xml><?xml version="1.0" encoding="utf-8"?>
+<p:sld xmlns:a="http://schemas.openxmlformats.org/drawingml/2006/main" xmlns:r="http://schemas.openxmlformats.org/officeDocument/2006/relationships" xmlns:p="http://schemas.openxmlformats.org/presentationml/2006/main">
+  <p:cSld>
+    <p:spTree>
+      <p:nvGrpSpPr>
+        <p:cNvPr id="1" name=""/>
+        <p:cNvGrpSpPr/>
+        <p:nvPr/>
+      </p:nvGrpSpPr>
+      <p:grpSpPr>
+        <a:xfrm>
+          <a:off x="0" y="0"/>
+          <a:ext cx="0" cy="0"/>
+          <a:chOff x="0" y="0"/>
+          <a:chExt cx="0" cy="0"/>
+        </a:xfrm>
+      </p:grpSpPr>
+      <p:sp>
+        <p:nvSpPr>
+          <p:cNvPr id="2" name="Title 1">
+            <a:extLst>
+              <a:ext uri="{FF2B5EF4-FFF2-40B4-BE49-F238E27FC236}">
+                <a16:creationId xmlns:a16="http://schemas.microsoft.com/office/drawing/2014/main" id="{845F4AEA-9AD5-4987-BC6F-212DE0DBA326}"/>
+              </a:ext>
+            </a:extLst>
+          </p:cNvPr>
+          <p:cNvSpPr>
+            <a:spLocks noGrp="1"/>
+          </p:cNvSpPr>
+          <p:nvPr>
+            <p:ph type="title"/>
+          </p:nvPr>
+        </p:nvSpPr>
+        <p:spPr/>
+        <p:txBody>
+          <a:bodyPr/>
+          <a:lstStyle/>
+          <a:p>
+            <a:r>
+              <a:rPr lang="en-US" dirty="0"/>
+              <a:t>Pseudocode </a:t>
+            </a:r>
+          </a:p>
+        </p:txBody>
+      </p:sp>
+      <p:sp>
+        <p:nvSpPr>
+          <p:cNvPr id="3" name="Content Placeholder 2">
+            <a:extLst>
+              <a:ext uri="{FF2B5EF4-FFF2-40B4-BE49-F238E27FC236}">
+                <a16:creationId xmlns:a16="http://schemas.microsoft.com/office/drawing/2014/main" id="{CD03C8B0-2037-4DC1-8B43-1FEF13EE700D}"/>
+              </a:ext>
+            </a:extLst>
+          </p:cNvPr>
+          <p:cNvSpPr>
+            <a:spLocks noGrp="1"/>
+          </p:cNvSpPr>
+          <p:nvPr>
+            <p:ph idx="1"/>
+          </p:nvPr>
+        </p:nvSpPr>
+        <p:spPr/>
+        <p:txBody>
+          <a:bodyPr/>
+          <a:lstStyle/>
+          <a:p>
+            <a:endParaRPr lang="en-US"/>
+          </a:p>
+        </p:txBody>
+      </p:sp>
+    </p:spTree>
+    <p:extLst>
+      <p:ext uri="{BB962C8B-B14F-4D97-AF65-F5344CB8AC3E}">
+        <p14:creationId xmlns:p14="http://schemas.microsoft.com/office/powerpoint/2010/main" val="1029992604"/>
+      </p:ext>
+    </p:extLst>
+  </p:cSld>
+  <p:clrMapOvr>
+    <a:masterClrMapping/>
+  </p:clrMapOvr>
+</p:sld>
+</file>
+
+<file path=ppt/slides/slide6.xml><?xml version="1.0" encoding="utf-8"?>
+<p:sld xmlns:a="http://schemas.openxmlformats.org/drawingml/2006/main" xmlns:r="http://schemas.openxmlformats.org/officeDocument/2006/relationships" xmlns:p="http://schemas.openxmlformats.org/presentationml/2006/main">
+  <p:cSld>
+    <p:spTree>
+      <p:nvGrpSpPr>
+        <p:cNvPr id="1" name=""/>
+        <p:cNvGrpSpPr/>
+        <p:nvPr/>
+      </p:nvGrpSpPr>
+      <p:grpSpPr>
+        <a:xfrm>
+          <a:off x="0" y="0"/>
+          <a:ext cx="0" cy="0"/>
+          <a:chOff x="0" y="0"/>
+          <a:chExt cx="0" cy="0"/>
+        </a:xfrm>
+      </p:grpSpPr>
+      <p:sp>
+        <p:nvSpPr>
+          <p:cNvPr id="2" name="Title 1">
+            <a:extLst>
+              <a:ext uri="{FF2B5EF4-FFF2-40B4-BE49-F238E27FC236}">
+                <a16:creationId xmlns:a16="http://schemas.microsoft.com/office/drawing/2014/main" id="{1712227C-2354-4896-9956-1B6D871C2E02}"/>
+              </a:ext>
+            </a:extLst>
+          </p:cNvPr>
+          <p:cNvSpPr>
+            <a:spLocks noGrp="1"/>
+          </p:cNvSpPr>
+          <p:nvPr>
+            <p:ph type="title"/>
+          </p:nvPr>
+        </p:nvSpPr>
+        <p:spPr/>
+        <p:txBody>
+          <a:bodyPr/>
+          <a:lstStyle/>
+          <a:p>
+            <a:r>
+              <a:rPr lang="en-US" dirty="0"/>
+              <a:t>Implementation</a:t>
+            </a:r>
+          </a:p>
+        </p:txBody>
+      </p:sp>
+      <p:sp>
+        <p:nvSpPr>
+          <p:cNvPr id="3" name="Content Placeholder 2">
+            <a:extLst>
+              <a:ext uri="{FF2B5EF4-FFF2-40B4-BE49-F238E27FC236}">
+                <a16:creationId xmlns:a16="http://schemas.microsoft.com/office/drawing/2014/main" id="{DE3405EC-FEF5-416E-96D7-2223B3088F55}"/>
+              </a:ext>
+            </a:extLst>
+          </p:cNvPr>
+          <p:cNvSpPr>
+            <a:spLocks noGrp="1"/>
+          </p:cNvSpPr>
+          <p:nvPr>
+            <p:ph idx="1"/>
+          </p:nvPr>
+        </p:nvSpPr>
+        <p:spPr/>
+        <p:txBody>
+          <a:bodyPr/>
+          <a:lstStyle/>
+          <a:p>
+            <a:endParaRPr lang="en-US"/>
+          </a:p>
+        </p:txBody>
+      </p:sp>
+    </p:spTree>
+    <p:extLst>
+      <p:ext uri="{BB962C8B-B14F-4D97-AF65-F5344CB8AC3E}">
+        <p14:creationId xmlns:p14="http://schemas.microsoft.com/office/powerpoint/2010/main" val="1954894357"/>
+      </p:ext>
+    </p:extLst>
+  </p:cSld>
+  <p:clrMapOvr>
+    <a:masterClrMapping/>
+  </p:clrMapOvr>
+</p:sld>
+</file>
+
+<file path=ppt/slides/slide7.xml><?xml version="1.0" encoding="utf-8"?>
+<p:sld xmlns:a="http://schemas.openxmlformats.org/drawingml/2006/main" xmlns:r="http://schemas.openxmlformats.org/officeDocument/2006/relationships" xmlns:p="http://schemas.openxmlformats.org/presentationml/2006/main">
+  <p:cSld>
+    <p:spTree>
+      <p:nvGrpSpPr>
+        <p:cNvPr id="1" name=""/>
+        <p:cNvGrpSpPr/>
+        <p:nvPr/>
+      </p:nvGrpSpPr>
+      <p:grpSpPr>
+        <a:xfrm>
+          <a:off x="0" y="0"/>
+          <a:ext cx="0" cy="0"/>
+          <a:chOff x="0" y="0"/>
+          <a:chExt cx="0" cy="0"/>
+        </a:xfrm>
+      </p:grpSpPr>
+      <p:sp>
+        <p:nvSpPr>
+          <p:cNvPr id="2" name="Title 1">
+            <a:extLst>
+              <a:ext uri="{FF2B5EF4-FFF2-40B4-BE49-F238E27FC236}">
+                <a16:creationId xmlns:a16="http://schemas.microsoft.com/office/drawing/2014/main" id="{FA9F59ED-2DFD-4BB4-AB6E-3FF359554C15}"/>
+              </a:ext>
+            </a:extLst>
+          </p:cNvPr>
+          <p:cNvSpPr>
+            <a:spLocks noGrp="1"/>
+          </p:cNvSpPr>
+          <p:nvPr>
+            <p:ph type="title"/>
+          </p:nvPr>
+        </p:nvSpPr>
+        <p:spPr/>
+        <p:txBody>
+          <a:bodyPr/>
+          <a:lstStyle/>
+          <a:p>
+            <a:r>
+              <a:rPr lang="en-US" dirty="0"/>
+              <a:t>Multi – Create and Run</a:t>
+            </a:r>
+          </a:p>
+        </p:txBody>
+      </p:sp>
+      <p:sp>
+        <p:nvSpPr>
+          <p:cNvPr id="3" name="Content Placeholder 2">
+            <a:extLst>
+              <a:ext uri="{FF2B5EF4-FFF2-40B4-BE49-F238E27FC236}">
+                <a16:creationId xmlns:a16="http://schemas.microsoft.com/office/drawing/2014/main" id="{15409D79-5553-4932-8475-DA725D46D1CE}"/>
+              </a:ext>
+            </a:extLst>
+          </p:cNvPr>
+          <p:cNvSpPr>
+            <a:spLocks noGrp="1"/>
+          </p:cNvSpPr>
+          <p:nvPr>
+            <p:ph idx="1"/>
+          </p:nvPr>
+        </p:nvSpPr>
+        <p:spPr/>
+        <p:txBody>
+          <a:bodyPr/>
+          <a:lstStyle/>
+          <a:p>
+            <a:endParaRPr lang="en-US"/>
+          </a:p>
+        </p:txBody>
+      </p:sp>
+    </p:spTree>
+    <p:extLst>
+      <p:ext uri="{BB962C8B-B14F-4D97-AF65-F5344CB8AC3E}">
+        <p14:creationId xmlns:p14="http://schemas.microsoft.com/office/powerpoint/2010/main" val="1595172196"/>
+      </p:ext>
+    </p:extLst>
+  </p:cSld>
+  <p:clrMapOvr>
+    <a:masterClrMapping/>
+  </p:clrMapOvr>
+</p:sld>
+</file>
+
+<file path=ppt/slides/slide8.xml><?xml version="1.0" encoding="utf-8"?>
+<p:sld xmlns:a="http://schemas.openxmlformats.org/drawingml/2006/main" xmlns:r="http://schemas.openxmlformats.org/officeDocument/2006/relationships" xmlns:p="http://schemas.openxmlformats.org/presentationml/2006/main">
+  <p:cSld>
+    <p:spTree>
+      <p:nvGrpSpPr>
+        <p:cNvPr id="1" name=""/>
+        <p:cNvGrpSpPr/>
+        <p:nvPr/>
+      </p:nvGrpSpPr>
+      <p:grpSpPr>
+        <a:xfrm>
+          <a:off x="0" y="0"/>
+          <a:ext cx="0" cy="0"/>
+          <a:chOff x="0" y="0"/>
+          <a:chExt cx="0" cy="0"/>
+        </a:xfrm>
+      </p:grpSpPr>
+      <p:sp>
+        <p:nvSpPr>
+          <p:cNvPr id="2" name="Title 1">
+            <a:extLst>
+              <a:ext uri="{FF2B5EF4-FFF2-40B4-BE49-F238E27FC236}">
+                <a16:creationId xmlns:a16="http://schemas.microsoft.com/office/drawing/2014/main" id="{6C9ACEF5-5019-489F-91F9-8F2113C072B7}"/>
+              </a:ext>
+            </a:extLst>
+          </p:cNvPr>
+          <p:cNvSpPr>
+            <a:spLocks noGrp="1"/>
+          </p:cNvSpPr>
+          <p:nvPr>
+            <p:ph type="title"/>
+          </p:nvPr>
+        </p:nvSpPr>
+        <p:spPr/>
+        <p:txBody>
+          <a:bodyPr/>
+          <a:lstStyle/>
+          <a:p>
+            <a:r>
+              <a:rPr lang="en-US" dirty="0"/>
+              <a:t>Scenario overviews</a:t>
+            </a:r>
+          </a:p>
+        </p:txBody>
+      </p:sp>
+      <p:sp>
+        <p:nvSpPr>
+          <p:cNvPr id="3" name="Content Placeholder 2">
+            <a:extLst>
+              <a:ext uri="{FF2B5EF4-FFF2-40B4-BE49-F238E27FC236}">
+                <a16:creationId xmlns:a16="http://schemas.microsoft.com/office/drawing/2014/main" id="{A7E9FEBC-73F4-4F74-AE32-6B5676AF2686}"/>
+              </a:ext>
+            </a:extLst>
+          </p:cNvPr>
+          <p:cNvSpPr>
+            <a:spLocks noGrp="1"/>
+          </p:cNvSpPr>
+          <p:nvPr>
+            <p:ph idx="1"/>
+          </p:nvPr>
+        </p:nvSpPr>
+        <p:spPr/>
+        <p:txBody>
+          <a:bodyPr/>
+          <a:lstStyle/>
+          <a:p>
+            <a:endParaRPr lang="en-US"/>
+          </a:p>
+        </p:txBody>
+      </p:sp>
+    </p:spTree>
+    <p:extLst>
+      <p:ext uri="{BB962C8B-B14F-4D97-AF65-F5344CB8AC3E}">
+        <p14:creationId xmlns:p14="http://schemas.microsoft.com/office/powerpoint/2010/main" val="2457639759"/>
+      </p:ext>
+    </p:extLst>
+  </p:cSld>
+  <p:clrMapOvr>
+    <a:masterClrMapping/>
+  </p:clrMapOvr>
+</p:sld>
+</file>
+
+<file path=ppt/slides/slide9.xml><?xml version="1.0" encoding="utf-8"?>
+<p:sld xmlns:a="http://schemas.openxmlformats.org/drawingml/2006/main" xmlns:r="http://schemas.openxmlformats.org/officeDocument/2006/relationships" xmlns:p="http://schemas.openxmlformats.org/presentationml/2006/main">
+  <p:cSld>
+    <p:spTree>
+      <p:nvGrpSpPr>
+        <p:cNvPr id="1" name=""/>
+        <p:cNvGrpSpPr/>
+        <p:nvPr/>
+      </p:nvGrpSpPr>
+      <p:grpSpPr>
+        <a:xfrm>
+          <a:off x="0" y="0"/>
+          <a:ext cx="0" cy="0"/>
+          <a:chOff x="0" y="0"/>
+          <a:chExt cx="0" cy="0"/>
+        </a:xfrm>
+      </p:grpSpPr>
+      <p:sp>
+        <p:nvSpPr>
+          <p:cNvPr id="2" name="Title 1">
+            <a:extLst>
+              <a:ext uri="{FF2B5EF4-FFF2-40B4-BE49-F238E27FC236}">
+                <a16:creationId xmlns:a16="http://schemas.microsoft.com/office/drawing/2014/main" id="{6A0D256F-4708-488A-A266-1E2908ABB986}"/>
+              </a:ext>
+            </a:extLst>
+          </p:cNvPr>
+          <p:cNvSpPr>
+            <a:spLocks noGrp="1"/>
+          </p:cNvSpPr>
+          <p:nvPr>
+            <p:ph type="title"/>
+          </p:nvPr>
+        </p:nvSpPr>
+        <p:spPr/>
+        <p:txBody>
+          <a:bodyPr/>
+          <a:lstStyle/>
+          <a:p>
+            <a:r>
+              <a:rPr lang="en-US" dirty="0"/>
+              <a:t>Steady state</a:t>
+            </a:r>
+          </a:p>
+        </p:txBody>
+      </p:sp>
+      <p:sp>
+        <p:nvSpPr>
+          <p:cNvPr id="4" name="Content Placeholder 3">
+            <a:extLst>
+              <a:ext uri="{FF2B5EF4-FFF2-40B4-BE49-F238E27FC236}">
+                <a16:creationId xmlns:a16="http://schemas.microsoft.com/office/drawing/2014/main" id="{ED2C4A3B-EF80-4B50-A046-DE6A721C38B2}"/>
+              </a:ext>
+            </a:extLst>
+          </p:cNvPr>
+          <p:cNvSpPr>
+            <a:spLocks noGrp="1"/>
+          </p:cNvSpPr>
+          <p:nvPr>
+            <p:ph idx="1"/>
+          </p:nvPr>
+        </p:nvSpPr>
+        <p:spPr/>
+        <p:txBody>
+          <a:bodyPr/>
+          <a:lstStyle/>
+          <a:p>
+            <a:endParaRPr lang="en-US"/>
+          </a:p>
+        </p:txBody>
+      </p:sp>
+      <p:sp>
+        <p:nvSpPr>
+          <p:cNvPr id="3" name="Text Placeholder 2">
+            <a:extLst>
+              <a:ext uri="{FF2B5EF4-FFF2-40B4-BE49-F238E27FC236}">
+                <a16:creationId xmlns:a16="http://schemas.microsoft.com/office/drawing/2014/main" id="{92F91529-CA4F-4CBD-9C32-4A6C7A8CDF0E}"/>
+              </a:ext>
+            </a:extLst>
+          </p:cNvPr>
+          <p:cNvSpPr>
+            <a:spLocks noGrp="1"/>
+          </p:cNvSpPr>
+          <p:nvPr>
+            <p:ph type="body" sz="half" idx="2"/>
+          </p:nvPr>
+        </p:nvSpPr>
+        <p:spPr/>
+        <p:txBody>
+          <a:bodyPr/>
+          <a:lstStyle/>
+          <a:p>
+            <a:r>
+              <a:rPr lang="en-US" dirty="0"/>
+              <a:t>All vehicles remain at initial velocity for the entire interval.</a:t>
+            </a:r>
+          </a:p>
+          <a:p>
+            <a:endParaRPr lang="en-US" dirty="0"/>
+          </a:p>
+          <a:p>
+            <a:endParaRPr lang="en-US" dirty="0"/>
+          </a:p>
+        </p:txBody>
+      </p:sp>
+    </p:spTree>
+    <p:extLst>
+      <p:ext uri="{BB962C8B-B14F-4D97-AF65-F5344CB8AC3E}">
+        <p14:creationId xmlns:p14="http://schemas.microsoft.com/office/powerpoint/2010/main" val="1884900069"/>
       </p:ext>
     </p:extLst>
   </p:cSld>

</xml_diff>